<commit_message>
Changed connection string for testing
</commit_message>
<xml_diff>
--- a/R Session.pptx
+++ b/R Session.pptx
@@ -243,7 +243,7 @@
           <a:p>
             <a:fld id="{E81C8EEB-7BA9-464D-8F34-E5231E8E18BB}" type="datetimeFigureOut">
               <a:rPr lang="en-US" smtClean="0"/>
-              <a:t>9/18/2016</a:t>
+              <a:t>9/19/2016</a:t>
             </a:fld>
             <a:endParaRPr lang="en-US"/>
           </a:p>
@@ -11264,7 +11264,7 @@
           <a:p>
             <a:fld id="{C798C88A-3EB1-48EE-BAEA-CE01783A4B66}" type="datetimeFigureOut">
               <a:rPr lang="en-US" smtClean="0"/>
-              <a:t>9/18/2016</a:t>
+              <a:t>9/19/2016</a:t>
             </a:fld>
             <a:endParaRPr lang="en-US"/>
           </a:p>
@@ -11471,7 +11471,7 @@
           <a:p>
             <a:fld id="{C798C88A-3EB1-48EE-BAEA-CE01783A4B66}" type="datetimeFigureOut">
               <a:rPr lang="en-US" smtClean="0"/>
-              <a:t>9/18/2016</a:t>
+              <a:t>9/19/2016</a:t>
             </a:fld>
             <a:endParaRPr lang="en-US"/>
           </a:p>
@@ -11651,7 +11651,7 @@
           <a:p>
             <a:fld id="{C798C88A-3EB1-48EE-BAEA-CE01783A4B66}" type="datetimeFigureOut">
               <a:rPr lang="en-US" smtClean="0"/>
-              <a:t>9/18/2016</a:t>
+              <a:t>9/19/2016</a:t>
             </a:fld>
             <a:endParaRPr lang="en-US"/>
           </a:p>
@@ -11856,7 +11856,7 @@
           <a:p>
             <a:fld id="{C798C88A-3EB1-48EE-BAEA-CE01783A4B66}" type="datetimeFigureOut">
               <a:rPr lang="en-US" smtClean="0"/>
-              <a:t>9/18/2016</a:t>
+              <a:t>9/19/2016</a:t>
             </a:fld>
             <a:endParaRPr lang="en-US"/>
           </a:p>
@@ -20754,7 +20754,7 @@
           <a:p>
             <a:fld id="{C798C88A-3EB1-48EE-BAEA-CE01783A4B66}" type="datetimeFigureOut">
               <a:rPr lang="en-US" smtClean="0"/>
-              <a:t>9/18/2016</a:t>
+              <a:t>9/19/2016</a:t>
             </a:fld>
             <a:endParaRPr lang="en-US"/>
           </a:p>
@@ -21028,7 +21028,7 @@
           <a:p>
             <a:fld id="{C798C88A-3EB1-48EE-BAEA-CE01783A4B66}" type="datetimeFigureOut">
               <a:rPr lang="en-US" smtClean="0"/>
-              <a:t>9/18/2016</a:t>
+              <a:t>9/19/2016</a:t>
             </a:fld>
             <a:endParaRPr lang="en-US"/>
           </a:p>
@@ -21426,7 +21426,7 @@
           <a:p>
             <a:fld id="{C798C88A-3EB1-48EE-BAEA-CE01783A4B66}" type="datetimeFigureOut">
               <a:rPr lang="en-US" smtClean="0"/>
-              <a:t>9/18/2016</a:t>
+              <a:t>9/19/2016</a:t>
             </a:fld>
             <a:endParaRPr lang="en-US"/>
           </a:p>
@@ -21544,7 +21544,7 @@
           <a:p>
             <a:fld id="{C798C88A-3EB1-48EE-BAEA-CE01783A4B66}" type="datetimeFigureOut">
               <a:rPr lang="en-US" smtClean="0"/>
-              <a:t>9/18/2016</a:t>
+              <a:t>9/19/2016</a:t>
             </a:fld>
             <a:endParaRPr lang="en-US"/>
           </a:p>
@@ -21639,7 +21639,7 @@
           <a:p>
             <a:fld id="{C798C88A-3EB1-48EE-BAEA-CE01783A4B66}" type="datetimeFigureOut">
               <a:rPr lang="en-US" smtClean="0"/>
-              <a:t>9/18/2016</a:t>
+              <a:t>9/19/2016</a:t>
             </a:fld>
             <a:endParaRPr lang="en-US"/>
           </a:p>
@@ -21929,7 +21929,7 @@
           <a:p>
             <a:fld id="{C798C88A-3EB1-48EE-BAEA-CE01783A4B66}" type="datetimeFigureOut">
               <a:rPr lang="en-US" smtClean="0"/>
-              <a:t>9/18/2016</a:t>
+              <a:t>9/19/2016</a:t>
             </a:fld>
             <a:endParaRPr lang="en-US"/>
           </a:p>
@@ -22209,7 +22209,7 @@
           <a:p>
             <a:fld id="{C798C88A-3EB1-48EE-BAEA-CE01783A4B66}" type="datetimeFigureOut">
               <a:rPr lang="en-US" smtClean="0"/>
-              <a:t>9/18/2016</a:t>
+              <a:t>9/19/2016</a:t>
             </a:fld>
             <a:endParaRPr lang="en-US"/>
           </a:p>
@@ -22489,7 +22489,7 @@
           <a:p>
             <a:fld id="{C798C88A-3EB1-48EE-BAEA-CE01783A4B66}" type="datetimeFigureOut">
               <a:rPr lang="en-US" smtClean="0"/>
-              <a:t>9/18/2016</a:t>
+              <a:t>9/19/2016</a:t>
             </a:fld>
             <a:endParaRPr lang="en-US"/>
           </a:p>
@@ -23554,7 +23554,7 @@
           <p:nvPr>
             <p:extLst>
               <p:ext uri="{D42A27DB-BD31-4B8C-83A1-F6EECF244321}">
-                <p14:modId xmlns:p14="http://schemas.microsoft.com/office/powerpoint/2010/main" val="1328644851"/>
+                <p14:modId xmlns:p14="http://schemas.microsoft.com/office/powerpoint/2010/main" val="1806796608"/>
               </p:ext>
             </p:extLst>
           </p:nvPr>
@@ -23627,7 +23627,7 @@
                     <a:p>
                       <a:r>
                         <a:rPr lang="en-US" sz="2800" dirty="0"/>
-                        <a:t>a + b</a:t>
+                        <a:t>5 + 2 == 7</a:t>
                       </a:r>
                     </a:p>
                   </a:txBody>
@@ -23674,7 +23674,7 @@
                     <a:p>
                       <a:r>
                         <a:rPr lang="en-US" sz="2800" dirty="0"/>
-                        <a:t>a – b</a:t>
+                        <a:t>5 – 2 == 3</a:t>
                       </a:r>
                     </a:p>
                   </a:txBody>
@@ -23721,7 +23721,7 @@
                     <a:p>
                       <a:r>
                         <a:rPr lang="en-US" sz="2800" dirty="0"/>
-                        <a:t>a * b</a:t>
+                        <a:t>5 * 2 == 10</a:t>
                       </a:r>
                     </a:p>
                   </a:txBody>
@@ -23768,11 +23768,11 @@
                     <a:p>
                       <a:r>
                         <a:rPr lang="en-US" sz="2800" dirty="0"/>
-                        <a:t>a</a:t>
+                        <a:t>5</a:t>
                       </a:r>
                       <a:r>
                         <a:rPr lang="en-US" sz="2800" baseline="0" dirty="0"/>
-                        <a:t> / b</a:t>
+                        <a:t> / 2 == 2.5</a:t>
                       </a:r>
                       <a:endParaRPr lang="en-US" sz="2800" dirty="0"/>
                     </a:p>
@@ -23820,7 +23820,7 @@
                     <a:p>
                       <a:r>
                         <a:rPr lang="en-US" sz="2800" dirty="0"/>
-                        <a:t>a %/% b</a:t>
+                        <a:t>5 %/% 2 == 2</a:t>
                       </a:r>
                     </a:p>
                   </a:txBody>
@@ -23841,7 +23841,7 @@
                       <a:pPr algn="ctr"/>
                       <a:r>
                         <a:rPr lang="en-US" sz="2800" dirty="0"/>
-                        <a:t>%% or **</a:t>
+                        <a:t>%%</a:t>
                       </a:r>
                     </a:p>
                   </a:txBody>
@@ -23867,7 +23867,7 @@
                     <a:p>
                       <a:r>
                         <a:rPr lang="en-US" sz="2800" dirty="0"/>
-                        <a:t>a %% b</a:t>
+                        <a:t>5 %% 2 == 1</a:t>
                       </a:r>
                     </a:p>
                   </a:txBody>
@@ -23888,7 +23888,7 @@
                       <a:pPr algn="ctr"/>
                       <a:r>
                         <a:rPr lang="en-US" sz="2800" dirty="0"/>
-                        <a:t>^</a:t>
+                        <a:t>^ or **</a:t>
                       </a:r>
                     </a:p>
                   </a:txBody>
@@ -23914,7 +23914,7 @@
                     <a:p>
                       <a:r>
                         <a:rPr lang="en-US" sz="2800" dirty="0"/>
-                        <a:t>a ^ b</a:t>
+                        <a:t>5 ^ 2 == 25</a:t>
                       </a:r>
                     </a:p>
                   </a:txBody>
@@ -24166,7 +24166,7 @@
           <p:nvPr>
             <p:extLst>
               <p:ext uri="{D42A27DB-BD31-4B8C-83A1-F6EECF244321}">
-                <p14:modId xmlns:p14="http://schemas.microsoft.com/office/powerpoint/2010/main" val="2632922311"/>
+                <p14:modId xmlns:p14="http://schemas.microsoft.com/office/powerpoint/2010/main" val="307220238"/>
               </p:ext>
             </p:extLst>
           </p:nvPr>
@@ -24622,11 +24622,15 @@
                     <a:p>
                       <a:r>
                         <a:rPr lang="en-US" sz="2800" dirty="0"/>
-                        <a:t>Is missing</a:t>
+                        <a:t>Is </a:t>
                       </a:r>
                       <a:r>
-                        <a:rPr lang="en-US" sz="2800" baseline="0" dirty="0"/>
-                        <a:t> - </a:t>
+                        <a:rPr lang="en-US" sz="2800"/>
+                        <a:t>missing</a:t>
+                      </a:r>
+                      <a:r>
+                        <a:rPr lang="en-US" sz="2800" baseline="0"/>
+                        <a:t> </a:t>
                       </a:r>
                       <a:endParaRPr lang="en-US" sz="2800" dirty="0"/>
                     </a:p>

</xml_diff>